<commit_message>
Added a missing link to the PPT
</commit_message>
<xml_diff>
--- a/Intro to Angular 2.pptx
+++ b/Intro to Angular 2.pptx
@@ -241,7 +241,7 @@
   </p:defaultTextStyle>
   <p:extLst>
     <p:ext uri="{EFAFB233-063F-42B5-8137-9DF3F51BA10A}">
-      <p15:sldGuideLst xmlns="" xmlns:p15="http://schemas.microsoft.com/office/powerpoint/2012/main">
+      <p15:sldGuideLst xmlns:p15="http://schemas.microsoft.com/office/powerpoint/2012/main" xmlns="">
         <p15:guide id="1" orient="horz" pos="1620">
           <p15:clr>
             <a:srgbClr val="A4A3A4"/>
@@ -6046,19 +6046,7 @@
                 <a:cs typeface="Roboto Condensed"/>
                 <a:sym typeface="Roboto Condensed"/>
               </a:rPr>
-              <a:t>Hyderabad, </a:t>
-            </a:r>
-            <a:r>
-              <a:rPr lang="en" sz="2400" dirty="0" smtClean="0">
-                <a:solidFill>
-                  <a:srgbClr val="FFFFFF"/>
-                </a:solidFill>
-                <a:latin typeface="Roboto Condensed"/>
-                <a:ea typeface="Roboto Condensed"/>
-                <a:cs typeface="Roboto Condensed"/>
-                <a:sym typeface="Roboto Condensed"/>
-              </a:rPr>
-              <a:t>18 June 2016</a:t>
+              <a:t>Hyderabad, 18 June 2016</a:t>
             </a:r>
             <a:endParaRPr lang="en" sz="2400" dirty="0">
               <a:solidFill>
@@ -6424,7 +6412,7 @@
         <p:spPr bwMode="auto">
           <a:xfrm>
             <a:off x="1666875" y="161925"/>
-            <a:ext cx="5810250" cy="4819650"/>
+            <a:ext cx="5810250" cy="4391025"/>
           </a:xfrm>
           <a:prstGeom prst="rect">
             <a:avLst/>
@@ -6454,6 +6442,46 @@
           </a:extLst>
         </p:spPr>
       </p:pic>
+      <p:sp>
+        <p:nvSpPr>
+          <p:cNvPr id="2" name="Rectangle 1"/>
+          <p:cNvSpPr/>
+          <p:nvPr/>
+        </p:nvSpPr>
+        <p:spPr>
+          <a:xfrm>
+            <a:off x="1905000" y="4702373"/>
+            <a:ext cx="4953000" cy="523220"/>
+          </a:xfrm>
+          <a:prstGeom prst="rect">
+            <a:avLst/>
+          </a:prstGeom>
+        </p:spPr>
+        <p:txBody>
+          <a:bodyPr wrap="square">
+            <a:spAutoFit/>
+          </a:bodyPr>
+          <a:lstStyle/>
+          <a:p>
+            <a:r>
+              <a:rPr lang="en-US" dirty="0">
+                <a:hlinkClick r:id="rId4"/>
+              </a:rPr>
+              <a:t>https://</a:t>
+            </a:r>
+            <a:r>
+              <a:rPr lang="en-US" dirty="0" smtClean="0">
+                <a:hlinkClick r:id="rId4"/>
+              </a:rPr>
+              <a:t>twitter.com/iamdevloper/status/517616294909464576</a:t>
+            </a:r>
+            <a:endParaRPr lang="en-US" dirty="0" smtClean="0"/>
+          </a:p>
+          <a:p>
+            <a:endParaRPr lang="en-US" dirty="0" smtClean="0"/>
+          </a:p>
+        </p:txBody>
+      </p:sp>
     </p:spTree>
     <p:extLst>
       <p:ext uri="{BB962C8B-B14F-4D97-AF65-F5344CB8AC3E}">
@@ -6697,14 +6725,6 @@
               </a:rPr>
               <a:t>Angular 2 and its dependencies</a:t>
             </a:r>
-            <a:endParaRPr lang="en-US" sz="2000" dirty="0" smtClean="0">
-              <a:solidFill>
-                <a:srgbClr val="434343"/>
-              </a:solidFill>
-              <a:latin typeface="Open Sans"/>
-              <a:ea typeface="Open Sans"/>
-              <a:cs typeface="Open Sans"/>
-            </a:endParaRPr>
           </a:p>
           <a:p>
             <a:pPr marL="457200" indent="-457200">
@@ -6803,14 +6823,6 @@
               </a:rPr>
               <a:t>Production workflow</a:t>
             </a:r>
-            <a:endParaRPr lang="en-US" sz="2000" dirty="0" smtClean="0">
-              <a:solidFill>
-                <a:srgbClr val="434343"/>
-              </a:solidFill>
-              <a:latin typeface="Open Sans"/>
-              <a:ea typeface="Open Sans"/>
-              <a:cs typeface="Open Sans"/>
-            </a:endParaRPr>
           </a:p>
           <a:p>
             <a:pPr marL="457200" indent="-457200">
@@ -6828,14 +6840,6 @@
               </a:rPr>
               <a:t>Web server to start application</a:t>
             </a:r>
-            <a:endParaRPr lang="en-US" sz="2000" dirty="0" smtClean="0">
-              <a:solidFill>
-                <a:srgbClr val="434343"/>
-              </a:solidFill>
-              <a:latin typeface="Open Sans"/>
-              <a:ea typeface="Open Sans"/>
-              <a:cs typeface="Open Sans"/>
-            </a:endParaRPr>
           </a:p>
           <a:p>
             <a:pPr marL="457200" indent="-457200">
@@ -7084,20 +7088,7 @@
                 <a:sym typeface="Open Sans"/>
                 <a:hlinkClick r:id="rId5"/>
               </a:rPr>
-              <a:t>http://www.a</a:t>
-            </a:r>
-            <a:r>
-              <a:rPr lang="en-US" sz="2400" dirty="0" smtClean="0">
-                <a:solidFill>
-                  <a:srgbClr val="434343"/>
-                </a:solidFill>
-                <a:latin typeface="Open Sans"/>
-                <a:ea typeface="Open Sans"/>
-                <a:cs typeface="Open Sans"/>
-                <a:sym typeface="Open Sans"/>
-                <a:hlinkClick r:id="rId5"/>
-              </a:rPr>
-              <a:t>ngularu.com</a:t>
+              <a:t>http://www.angularu.com</a:t>
             </a:r>
             <a:endParaRPr lang="en-US" sz="2400" dirty="0" smtClean="0">
               <a:solidFill>
@@ -7128,20 +7119,7 @@
                 <a:sym typeface="Open Sans"/>
                 <a:hlinkClick r:id="rId6"/>
               </a:rPr>
-              <a:t>http://www.v</a:t>
-            </a:r>
-            <a:r>
-              <a:rPr lang="en-US" sz="2400" dirty="0" smtClean="0">
-                <a:solidFill>
-                  <a:srgbClr val="434343"/>
-                </a:solidFill>
-                <a:latin typeface="Open Sans"/>
-                <a:ea typeface="Open Sans"/>
-                <a:cs typeface="Open Sans"/>
-                <a:sym typeface="Open Sans"/>
-                <a:hlinkClick r:id="rId6"/>
-              </a:rPr>
-              <a:t>ictorsavkin.com</a:t>
+              <a:t>http://www.victorsavkin.com</a:t>
             </a:r>
             <a:endParaRPr lang="en-US" sz="2400" dirty="0" smtClean="0">
               <a:solidFill>
@@ -8223,29 +8201,8 @@
                 <a:cs typeface="Roboto"/>
                 <a:sym typeface="Roboto"/>
               </a:rPr>
-              <a:t>Angular 2 Core Concepts: Components, Change Detection, Dependency </a:t>
+              <a:t>Angular 2 Core Concepts: Components, Change Detection, Dependency Injection, Zones</a:t>
             </a:r>
-            <a:r>
-              <a:rPr lang="en" sz="1900" b="0" i="0" u="none" strike="noStrike" cap="none" baseline="0" dirty="0" smtClean="0">
-                <a:solidFill>
-                  <a:srgbClr val="FFFFFF"/>
-                </a:solidFill>
-                <a:latin typeface="Roboto"/>
-                <a:ea typeface="Roboto"/>
-                <a:cs typeface="Roboto"/>
-                <a:sym typeface="Roboto"/>
-              </a:rPr>
-              <a:t>Injection, Zones</a:t>
-            </a:r>
-            <a:endParaRPr lang="en" sz="1900" b="0" i="0" u="none" strike="noStrike" cap="none" baseline="0" dirty="0" smtClean="0">
-              <a:solidFill>
-                <a:srgbClr val="FFFFFF"/>
-              </a:solidFill>
-              <a:latin typeface="Roboto"/>
-              <a:ea typeface="Roboto"/>
-              <a:cs typeface="Roboto"/>
-              <a:sym typeface="Roboto"/>
-            </a:endParaRPr>
           </a:p>
           <a:p>
             <a:pPr lvl="0">
@@ -9624,18 +9581,7 @@
                 <a:ea typeface="Open Sans"/>
                 <a:cs typeface="Open Sans"/>
               </a:rPr>
-              <a:t>Three types of </a:t>
-            </a:r>
-            <a:r>
-              <a:rPr lang="en-US" sz="2400" dirty="0" smtClean="0">
-                <a:solidFill>
-                  <a:srgbClr val="434343"/>
-                </a:solidFill>
-                <a:latin typeface="Open Sans"/>
-                <a:ea typeface="Open Sans"/>
-                <a:cs typeface="Open Sans"/>
-              </a:rPr>
-              <a:t>directives</a:t>
+              <a:t>Three types of directives</a:t>
             </a:r>
           </a:p>
           <a:p>
@@ -9654,14 +9600,6 @@
               </a:rPr>
               <a:t>Components</a:t>
             </a:r>
-            <a:endParaRPr lang="en-US" sz="2400" dirty="0" smtClean="0">
-              <a:solidFill>
-                <a:srgbClr val="434343"/>
-              </a:solidFill>
-              <a:latin typeface="Open Sans"/>
-              <a:ea typeface="Open Sans"/>
-              <a:cs typeface="Open Sans"/>
-            </a:endParaRPr>
           </a:p>
           <a:p>
             <a:pPr marL="457200" indent="-457200">
@@ -9679,14 +9617,6 @@
               </a:rPr>
               <a:t>Attribute Directives</a:t>
             </a:r>
-            <a:endParaRPr lang="en-US" sz="2400" dirty="0" smtClean="0">
-              <a:solidFill>
-                <a:srgbClr val="434343"/>
-              </a:solidFill>
-              <a:latin typeface="Open Sans"/>
-              <a:ea typeface="Open Sans"/>
-              <a:cs typeface="Open Sans"/>
-            </a:endParaRPr>
           </a:p>
           <a:p>
             <a:pPr marL="457200" indent="-457200">

</xml_diff>